<commit_message>
Add artifacts to support the Auto Ingestion pipeline
</commit_message>
<xml_diff>
--- a/Azure Synapse Analytics PoC Environment.pptx
+++ b/Azure Synapse Analytics PoC Environment.pptx
@@ -109,6 +109,11 @@
       </a:defRPr>
     </a:lvl9pPr>
   </p:defaultTextStyle>
+  <p:extLst>
+    <p:ext uri="{EFAFB233-063F-42B5-8137-9DF3F51BA10A}">
+      <p15:sldGuideLst xmlns:p15="http://schemas.microsoft.com/office/powerpoint/2012/main"/>
+    </p:ext>
+  </p:extLst>
 </p:presentation>
 </file>
 
@@ -259,7 +264,7 @@
           <a:p>
             <a:fld id="{440A345A-3D28-4D0B-AD34-7B8B4219FF1D}" type="datetimeFigureOut">
               <a:rPr lang="en-US" smtClean="0"/>
-              <a:t>8/5/2021</a:t>
+              <a:t>10/4/2021</a:t>
             </a:fld>
             <a:endParaRPr lang="en-US"/>
           </a:p>
@@ -457,7 +462,7 @@
           <a:p>
             <a:fld id="{440A345A-3D28-4D0B-AD34-7B8B4219FF1D}" type="datetimeFigureOut">
               <a:rPr lang="en-US" smtClean="0"/>
-              <a:t>8/5/2021</a:t>
+              <a:t>10/4/2021</a:t>
             </a:fld>
             <a:endParaRPr lang="en-US"/>
           </a:p>
@@ -665,7 +670,7 @@
           <a:p>
             <a:fld id="{440A345A-3D28-4D0B-AD34-7B8B4219FF1D}" type="datetimeFigureOut">
               <a:rPr lang="en-US" smtClean="0"/>
-              <a:t>8/5/2021</a:t>
+              <a:t>10/4/2021</a:t>
             </a:fld>
             <a:endParaRPr lang="en-US"/>
           </a:p>
@@ -863,7 +868,7 @@
           <a:p>
             <a:fld id="{440A345A-3D28-4D0B-AD34-7B8B4219FF1D}" type="datetimeFigureOut">
               <a:rPr lang="en-US" smtClean="0"/>
-              <a:t>8/5/2021</a:t>
+              <a:t>10/4/2021</a:t>
             </a:fld>
             <a:endParaRPr lang="en-US"/>
           </a:p>
@@ -1138,7 +1143,7 @@
           <a:p>
             <a:fld id="{440A345A-3D28-4D0B-AD34-7B8B4219FF1D}" type="datetimeFigureOut">
               <a:rPr lang="en-US" smtClean="0"/>
-              <a:t>8/5/2021</a:t>
+              <a:t>10/4/2021</a:t>
             </a:fld>
             <a:endParaRPr lang="en-US"/>
           </a:p>
@@ -1403,7 +1408,7 @@
           <a:p>
             <a:fld id="{440A345A-3D28-4D0B-AD34-7B8B4219FF1D}" type="datetimeFigureOut">
               <a:rPr lang="en-US" smtClean="0"/>
-              <a:t>8/5/2021</a:t>
+              <a:t>10/4/2021</a:t>
             </a:fld>
             <a:endParaRPr lang="en-US"/>
           </a:p>
@@ -1815,7 +1820,7 @@
           <a:p>
             <a:fld id="{440A345A-3D28-4D0B-AD34-7B8B4219FF1D}" type="datetimeFigureOut">
               <a:rPr lang="en-US" smtClean="0"/>
-              <a:t>8/5/2021</a:t>
+              <a:t>10/4/2021</a:t>
             </a:fld>
             <a:endParaRPr lang="en-US"/>
           </a:p>
@@ -1956,7 +1961,7 @@
           <a:p>
             <a:fld id="{440A345A-3D28-4D0B-AD34-7B8B4219FF1D}" type="datetimeFigureOut">
               <a:rPr lang="en-US" smtClean="0"/>
-              <a:t>8/5/2021</a:t>
+              <a:t>10/4/2021</a:t>
             </a:fld>
             <a:endParaRPr lang="en-US"/>
           </a:p>
@@ -2069,7 +2074,7 @@
           <a:p>
             <a:fld id="{440A345A-3D28-4D0B-AD34-7B8B4219FF1D}" type="datetimeFigureOut">
               <a:rPr lang="en-US" smtClean="0"/>
-              <a:t>8/5/2021</a:t>
+              <a:t>10/4/2021</a:t>
             </a:fld>
             <a:endParaRPr lang="en-US"/>
           </a:p>
@@ -2380,7 +2385,7 @@
           <a:p>
             <a:fld id="{440A345A-3D28-4D0B-AD34-7B8B4219FF1D}" type="datetimeFigureOut">
               <a:rPr lang="en-US" smtClean="0"/>
-              <a:t>8/5/2021</a:t>
+              <a:t>10/4/2021</a:t>
             </a:fld>
             <a:endParaRPr lang="en-US"/>
           </a:p>
@@ -2668,7 +2673,7 @@
           <a:p>
             <a:fld id="{440A345A-3D28-4D0B-AD34-7B8B4219FF1D}" type="datetimeFigureOut">
               <a:rPr lang="en-US" smtClean="0"/>
-              <a:t>8/5/2021</a:t>
+              <a:t>10/4/2021</a:t>
             </a:fld>
             <a:endParaRPr lang="en-US"/>
           </a:p>
@@ -2909,7 +2914,7 @@
           <a:p>
             <a:fld id="{440A345A-3D28-4D0B-AD34-7B8B4219FF1D}" type="datetimeFigureOut">
               <a:rPr lang="en-US" smtClean="0"/>
-              <a:t>8/5/2021</a:t>
+              <a:t>10/4/2021</a:t>
             </a:fld>
             <a:endParaRPr lang="en-US"/>
           </a:p>
@@ -7191,7 +7196,7 @@
                 <a:ea typeface="+mn-ea"/>
                 <a:cs typeface="Segoe UI" panose="020B0502040204020203" pitchFamily="34" charset="0"/>
               </a:rPr>
-              <a:t>./configure.sh		(Configurations that can’t be done in Terraform)</a:t>
+              <a:t>bash configure.sh	(Configurations that can’t be done in Terraform)</a:t>
             </a:r>
             <a:endParaRPr kumimoji="0" lang="en-US" sz="1400" b="0" i="0" u="none" strike="noStrike" kern="1200" cap="none" spc="0" normalizeH="0" baseline="0" noProof="0" dirty="0">
               <a:ln>

</xml_diff>

<commit_message>
Renamed the files to be more standardized with Terraform and so that users only need to edit the terraform.tfvars file
</commit_message>
<xml_diff>
--- a/Azure Synapse Analytics PoC Environment.pptx
+++ b/Azure Synapse Analytics PoC Environment.pptx
@@ -264,7 +264,7 @@
           <a:p>
             <a:fld id="{440A345A-3D28-4D0B-AD34-7B8B4219FF1D}" type="datetimeFigureOut">
               <a:rPr lang="en-US" smtClean="0"/>
-              <a:t>10/4/2021</a:t>
+              <a:t>10/8/2021</a:t>
             </a:fld>
             <a:endParaRPr lang="en-US"/>
           </a:p>
@@ -462,7 +462,7 @@
           <a:p>
             <a:fld id="{440A345A-3D28-4D0B-AD34-7B8B4219FF1D}" type="datetimeFigureOut">
               <a:rPr lang="en-US" smtClean="0"/>
-              <a:t>10/4/2021</a:t>
+              <a:t>10/8/2021</a:t>
             </a:fld>
             <a:endParaRPr lang="en-US"/>
           </a:p>
@@ -670,7 +670,7 @@
           <a:p>
             <a:fld id="{440A345A-3D28-4D0B-AD34-7B8B4219FF1D}" type="datetimeFigureOut">
               <a:rPr lang="en-US" smtClean="0"/>
-              <a:t>10/4/2021</a:t>
+              <a:t>10/8/2021</a:t>
             </a:fld>
             <a:endParaRPr lang="en-US"/>
           </a:p>
@@ -868,7 +868,7 @@
           <a:p>
             <a:fld id="{440A345A-3D28-4D0B-AD34-7B8B4219FF1D}" type="datetimeFigureOut">
               <a:rPr lang="en-US" smtClean="0"/>
-              <a:t>10/4/2021</a:t>
+              <a:t>10/8/2021</a:t>
             </a:fld>
             <a:endParaRPr lang="en-US"/>
           </a:p>
@@ -1143,7 +1143,7 @@
           <a:p>
             <a:fld id="{440A345A-3D28-4D0B-AD34-7B8B4219FF1D}" type="datetimeFigureOut">
               <a:rPr lang="en-US" smtClean="0"/>
-              <a:t>10/4/2021</a:t>
+              <a:t>10/8/2021</a:t>
             </a:fld>
             <a:endParaRPr lang="en-US"/>
           </a:p>
@@ -1408,7 +1408,7 @@
           <a:p>
             <a:fld id="{440A345A-3D28-4D0B-AD34-7B8B4219FF1D}" type="datetimeFigureOut">
               <a:rPr lang="en-US" smtClean="0"/>
-              <a:t>10/4/2021</a:t>
+              <a:t>10/8/2021</a:t>
             </a:fld>
             <a:endParaRPr lang="en-US"/>
           </a:p>
@@ -1820,7 +1820,7 @@
           <a:p>
             <a:fld id="{440A345A-3D28-4D0B-AD34-7B8B4219FF1D}" type="datetimeFigureOut">
               <a:rPr lang="en-US" smtClean="0"/>
-              <a:t>10/4/2021</a:t>
+              <a:t>10/8/2021</a:t>
             </a:fld>
             <a:endParaRPr lang="en-US"/>
           </a:p>
@@ -1961,7 +1961,7 @@
           <a:p>
             <a:fld id="{440A345A-3D28-4D0B-AD34-7B8B4219FF1D}" type="datetimeFigureOut">
               <a:rPr lang="en-US" smtClean="0"/>
-              <a:t>10/4/2021</a:t>
+              <a:t>10/8/2021</a:t>
             </a:fld>
             <a:endParaRPr lang="en-US"/>
           </a:p>
@@ -2074,7 +2074,7 @@
           <a:p>
             <a:fld id="{440A345A-3D28-4D0B-AD34-7B8B4219FF1D}" type="datetimeFigureOut">
               <a:rPr lang="en-US" smtClean="0"/>
-              <a:t>10/4/2021</a:t>
+              <a:t>10/8/2021</a:t>
             </a:fld>
             <a:endParaRPr lang="en-US"/>
           </a:p>
@@ -2385,7 +2385,7 @@
           <a:p>
             <a:fld id="{440A345A-3D28-4D0B-AD34-7B8B4219FF1D}" type="datetimeFigureOut">
               <a:rPr lang="en-US" smtClean="0"/>
-              <a:t>10/4/2021</a:t>
+              <a:t>10/8/2021</a:t>
             </a:fld>
             <a:endParaRPr lang="en-US"/>
           </a:p>
@@ -2673,7 +2673,7 @@
           <a:p>
             <a:fld id="{440A345A-3D28-4D0B-AD34-7B8B4219FF1D}" type="datetimeFigureOut">
               <a:rPr lang="en-US" smtClean="0"/>
-              <a:t>10/4/2021</a:t>
+              <a:t>10/8/2021</a:t>
             </a:fld>
             <a:endParaRPr lang="en-US"/>
           </a:p>
@@ -2914,7 +2914,7 @@
           <a:p>
             <a:fld id="{440A345A-3D28-4D0B-AD34-7B8B4219FF1D}" type="datetimeFigureOut">
               <a:rPr lang="en-US" smtClean="0"/>
-              <a:t>10/4/2021</a:t>
+              <a:t>10/8/2021</a:t>
             </a:fld>
             <a:endParaRPr lang="en-US"/>
           </a:p>
@@ -4085,6 +4085,18 @@
   <p:clrMapOvr>
     <a:masterClrMapping/>
   </p:clrMapOvr>
+  <mc:AlternateContent xmlns:mc="http://schemas.openxmlformats.org/markup-compatibility/2006">
+    <mc:Choice xmlns:p159="http://schemas.microsoft.com/office/powerpoint/2015/09/main" Requires="p159">
+      <p:transition xmlns:p14="http://schemas.microsoft.com/office/powerpoint/2010/main" spd="slow" p14:dur="2000">
+        <p159:morph option="byObject"/>
+      </p:transition>
+    </mc:Choice>
+    <mc:Fallback>
+      <p:transition spd="slow">
+        <p:fade/>
+      </p:transition>
+    </mc:Fallback>
+  </mc:AlternateContent>
 </p:sld>
 </file>
 
@@ -6933,7 +6945,45 @@
                 <a:ea typeface="+mn-ea"/>
                 <a:cs typeface="Segoe UI" panose="020B0502040204020203" pitchFamily="34" charset="0"/>
               </a:rPr>
-              <a:t>nano environment.tf	(Edit the variables to your environment)</a:t>
+              <a:t>nano </a:t>
+            </a:r>
+            <a:r>
+              <a:rPr kumimoji="0" lang="en-US" sz="800" b="0" i="0" u="none" strike="noStrike" kern="1200" cap="none" spc="0" normalizeH="0" baseline="0" noProof="0" dirty="0" err="1">
+                <a:ln>
+                  <a:noFill/>
+                </a:ln>
+                <a:solidFill>
+                  <a:srgbClr val="A5A5A5">
+                    <a:lumMod val="75000"/>
+                  </a:srgbClr>
+                </a:solidFill>
+                <a:effectLst/>
+                <a:uLnTx/>
+                <a:uFillTx/>
+                <a:latin typeface="Segoe UI" panose="020B0502040204020203" pitchFamily="34" charset="0"/>
+                <a:ea typeface="+mn-ea"/>
+                <a:cs typeface="Segoe UI" panose="020B0502040204020203" pitchFamily="34" charset="0"/>
+              </a:rPr>
+              <a:t>terraform.tfvars</a:t>
+            </a:r>
+            <a:r>
+              <a:rPr kumimoji="0" lang="en-US" sz="800" b="0" i="0" u="none" strike="noStrike" kern="1200" cap="none" spc="0" normalizeH="0" baseline="0" noProof="0" dirty="0">
+                <a:ln>
+                  <a:noFill/>
+                </a:ln>
+                <a:solidFill>
+                  <a:srgbClr val="A5A5A5">
+                    <a:lumMod val="75000"/>
+                  </a:srgbClr>
+                </a:solidFill>
+                <a:effectLst/>
+                <a:uLnTx/>
+                <a:uFillTx/>
+                <a:latin typeface="Segoe UI" panose="020B0502040204020203" pitchFamily="34" charset="0"/>
+                <a:ea typeface="+mn-ea"/>
+                <a:cs typeface="Segoe UI" panose="020B0502040204020203" pitchFamily="34" charset="0"/>
+              </a:rPr>
+              <a:t>	(Edit the variables to your environment)</a:t>
             </a:r>
           </a:p>
           <a:p>
@@ -8242,6 +8292,18 @@
   <p:clrMapOvr>
     <a:masterClrMapping/>
   </p:clrMapOvr>
+  <mc:AlternateContent xmlns:mc="http://schemas.openxmlformats.org/markup-compatibility/2006">
+    <mc:Choice xmlns:p159="http://schemas.microsoft.com/office/powerpoint/2015/09/main" Requires="p159">
+      <p:transition xmlns:p14="http://schemas.microsoft.com/office/powerpoint/2010/main" spd="slow" p14:dur="2000">
+        <p159:morph option="byObject"/>
+      </p:transition>
+    </mc:Choice>
+    <mc:Fallback>
+      <p:transition spd="slow">
+        <p:fade/>
+      </p:transition>
+    </mc:Fallback>
+  </mc:AlternateContent>
 </p:sld>
 </file>
 
@@ -11044,6 +11106,18 @@
   <p:clrMapOvr>
     <a:masterClrMapping/>
   </p:clrMapOvr>
+  <mc:AlternateContent xmlns:mc="http://schemas.openxmlformats.org/markup-compatibility/2006">
+    <mc:Choice xmlns:p159="http://schemas.microsoft.com/office/powerpoint/2015/09/main" Requires="p159">
+      <p:transition xmlns:p14="http://schemas.microsoft.com/office/powerpoint/2010/main" spd="slow" p14:dur="2000">
+        <p159:morph option="byObject"/>
+      </p:transition>
+    </mc:Choice>
+    <mc:Fallback>
+      <p:transition spd="slow">
+        <p:fade/>
+      </p:transition>
+    </mc:Fallback>
+  </mc:AlternateContent>
 </p:sld>
 </file>
 
@@ -15133,6 +15207,18 @@
   <p:clrMapOvr>
     <a:masterClrMapping/>
   </p:clrMapOvr>
+  <mc:AlternateContent xmlns:mc="http://schemas.openxmlformats.org/markup-compatibility/2006">
+    <mc:Choice xmlns:p159="http://schemas.microsoft.com/office/powerpoint/2015/09/main" Requires="p159">
+      <p:transition xmlns:p14="http://schemas.microsoft.com/office/powerpoint/2010/main" spd="slow" p14:dur="2000">
+        <p159:morph option="byObject"/>
+      </p:transition>
+    </mc:Choice>
+    <mc:Fallback>
+      <p:transition spd="slow">
+        <p:fade/>
+      </p:transition>
+    </mc:Fallback>
+  </mc:AlternateContent>
 </p:sld>
 </file>
 
@@ -18896,6 +18982,18 @@
   <p:clrMapOvr>
     <a:masterClrMapping/>
   </p:clrMapOvr>
+  <mc:AlternateContent xmlns:mc="http://schemas.openxmlformats.org/markup-compatibility/2006">
+    <mc:Choice xmlns:p159="http://schemas.microsoft.com/office/powerpoint/2015/09/main" Requires="p159">
+      <p:transition xmlns:p14="http://schemas.microsoft.com/office/powerpoint/2010/main" spd="slow" p14:dur="2000">
+        <p159:morph option="byObject"/>
+      </p:transition>
+    </mc:Choice>
+    <mc:Fallback>
+      <p:transition spd="slow">
+        <p:fade/>
+      </p:transition>
+    </mc:Fallback>
+  </mc:AlternateContent>
 </p:sld>
 </file>
 
@@ -21852,6 +21950,18 @@
   <p:clrMapOvr>
     <a:masterClrMapping/>
   </p:clrMapOvr>
+  <mc:AlternateContent xmlns:mc="http://schemas.openxmlformats.org/markup-compatibility/2006">
+    <mc:Choice xmlns:p159="http://schemas.microsoft.com/office/powerpoint/2015/09/main" Requires="p159">
+      <p:transition xmlns:p14="http://schemas.microsoft.com/office/powerpoint/2010/main" spd="slow" p14:dur="2000">
+        <p159:morph option="byObject"/>
+      </p:transition>
+    </mc:Choice>
+    <mc:Fallback>
+      <p:transition spd="slow">
+        <p:fade/>
+      </p:transition>
+    </mc:Fallback>
+  </mc:AlternateContent>
 </p:sld>
 </file>
 

</xml_diff>

<commit_message>
Updated the PowerPoint instructions
</commit_message>
<xml_diff>
--- a/Azure Synapse Analytics PoC Environment.pptx
+++ b/Azure Synapse Analytics PoC Environment.pptx
@@ -264,7 +264,7 @@
           <a:p>
             <a:fld id="{440A345A-3D28-4D0B-AD34-7B8B4219FF1D}" type="datetimeFigureOut">
               <a:rPr lang="en-US" smtClean="0"/>
-              <a:t>11/11/2021</a:t>
+              <a:t>11/19/2021</a:t>
             </a:fld>
             <a:endParaRPr lang="en-US"/>
           </a:p>
@@ -462,7 +462,7 @@
           <a:p>
             <a:fld id="{440A345A-3D28-4D0B-AD34-7B8B4219FF1D}" type="datetimeFigureOut">
               <a:rPr lang="en-US" smtClean="0"/>
-              <a:t>11/11/2021</a:t>
+              <a:t>11/19/2021</a:t>
             </a:fld>
             <a:endParaRPr lang="en-US"/>
           </a:p>
@@ -670,7 +670,7 @@
           <a:p>
             <a:fld id="{440A345A-3D28-4D0B-AD34-7B8B4219FF1D}" type="datetimeFigureOut">
               <a:rPr lang="en-US" smtClean="0"/>
-              <a:t>11/11/2021</a:t>
+              <a:t>11/19/2021</a:t>
             </a:fld>
             <a:endParaRPr lang="en-US"/>
           </a:p>
@@ -868,7 +868,7 @@
           <a:p>
             <a:fld id="{440A345A-3D28-4D0B-AD34-7B8B4219FF1D}" type="datetimeFigureOut">
               <a:rPr lang="en-US" smtClean="0"/>
-              <a:t>11/11/2021</a:t>
+              <a:t>11/19/2021</a:t>
             </a:fld>
             <a:endParaRPr lang="en-US"/>
           </a:p>
@@ -1143,7 +1143,7 @@
           <a:p>
             <a:fld id="{440A345A-3D28-4D0B-AD34-7B8B4219FF1D}" type="datetimeFigureOut">
               <a:rPr lang="en-US" smtClean="0"/>
-              <a:t>11/11/2021</a:t>
+              <a:t>11/19/2021</a:t>
             </a:fld>
             <a:endParaRPr lang="en-US"/>
           </a:p>
@@ -1408,7 +1408,7 @@
           <a:p>
             <a:fld id="{440A345A-3D28-4D0B-AD34-7B8B4219FF1D}" type="datetimeFigureOut">
               <a:rPr lang="en-US" smtClean="0"/>
-              <a:t>11/11/2021</a:t>
+              <a:t>11/19/2021</a:t>
             </a:fld>
             <a:endParaRPr lang="en-US"/>
           </a:p>
@@ -1820,7 +1820,7 @@
           <a:p>
             <a:fld id="{440A345A-3D28-4D0B-AD34-7B8B4219FF1D}" type="datetimeFigureOut">
               <a:rPr lang="en-US" smtClean="0"/>
-              <a:t>11/11/2021</a:t>
+              <a:t>11/19/2021</a:t>
             </a:fld>
             <a:endParaRPr lang="en-US"/>
           </a:p>
@@ -1961,7 +1961,7 @@
           <a:p>
             <a:fld id="{440A345A-3D28-4D0B-AD34-7B8B4219FF1D}" type="datetimeFigureOut">
               <a:rPr lang="en-US" smtClean="0"/>
-              <a:t>11/11/2021</a:t>
+              <a:t>11/19/2021</a:t>
             </a:fld>
             <a:endParaRPr lang="en-US"/>
           </a:p>
@@ -2074,7 +2074,7 @@
           <a:p>
             <a:fld id="{440A345A-3D28-4D0B-AD34-7B8B4219FF1D}" type="datetimeFigureOut">
               <a:rPr lang="en-US" smtClean="0"/>
-              <a:t>11/11/2021</a:t>
+              <a:t>11/19/2021</a:t>
             </a:fld>
             <a:endParaRPr lang="en-US"/>
           </a:p>
@@ -2385,7 +2385,7 @@
           <a:p>
             <a:fld id="{440A345A-3D28-4D0B-AD34-7B8B4219FF1D}" type="datetimeFigureOut">
               <a:rPr lang="en-US" smtClean="0"/>
-              <a:t>11/11/2021</a:t>
+              <a:t>11/19/2021</a:t>
             </a:fld>
             <a:endParaRPr lang="en-US"/>
           </a:p>
@@ -2673,7 +2673,7 @@
           <a:p>
             <a:fld id="{440A345A-3D28-4D0B-AD34-7B8B4219FF1D}" type="datetimeFigureOut">
               <a:rPr lang="en-US" smtClean="0"/>
-              <a:t>11/11/2021</a:t>
+              <a:t>11/19/2021</a:t>
             </a:fld>
             <a:endParaRPr lang="en-US"/>
           </a:p>
@@ -2914,7 +2914,7 @@
           <a:p>
             <a:fld id="{440A345A-3D28-4D0B-AD34-7B8B4219FF1D}" type="datetimeFigureOut">
               <a:rPr lang="en-US" smtClean="0"/>
-              <a:t>11/11/2021</a:t>
+              <a:t>11/19/2021</a:t>
             </a:fld>
             <a:endParaRPr lang="en-US"/>
           </a:p>
@@ -6580,7 +6580,7 @@
         <p:spPr>
           <a:xfrm>
             <a:off x="126715" y="894912"/>
-            <a:ext cx="5247883" cy="5539978"/>
+            <a:ext cx="5247883" cy="5047536"/>
           </a:xfrm>
           <a:prstGeom prst="rect">
             <a:avLst/>
@@ -6945,49 +6945,11 @@
                 <a:ea typeface="+mn-ea"/>
                 <a:cs typeface="Segoe UI" panose="020B0502040204020203" pitchFamily="34" charset="0"/>
               </a:rPr>
-              <a:t>code </a:t>
+              <a:t>bash deploySynapse.sh</a:t>
             </a:r>
-            <a:r>
-              <a:rPr kumimoji="0" lang="en-US" sz="800" b="0" i="0" u="none" strike="noStrike" kern="1200" cap="none" spc="0" normalizeH="0" baseline="0" noProof="0" dirty="0" err="1">
-                <a:ln>
-                  <a:noFill/>
-                </a:ln>
-                <a:solidFill>
-                  <a:srgbClr val="A5A5A5">
-                    <a:lumMod val="75000"/>
-                  </a:srgbClr>
-                </a:solidFill>
-                <a:effectLst/>
-                <a:uLnTx/>
-                <a:uFillTx/>
-                <a:latin typeface="Segoe UI" panose="020B0502040204020203" pitchFamily="34" charset="0"/>
-                <a:ea typeface="+mn-ea"/>
-                <a:cs typeface="Segoe UI" panose="020B0502040204020203" pitchFamily="34" charset="0"/>
-              </a:rPr>
-              <a:t>terraform.tfvars</a:t>
-            </a:r>
-            <a:r>
-              <a:rPr kumimoji="0" lang="en-US" sz="800" b="0" i="0" u="none" strike="noStrike" kern="1200" cap="none" spc="0" normalizeH="0" baseline="0" noProof="0" dirty="0">
-                <a:ln>
-                  <a:noFill/>
-                </a:ln>
-                <a:solidFill>
-                  <a:srgbClr val="A5A5A5">
-                    <a:lumMod val="75000"/>
-                  </a:srgbClr>
-                </a:solidFill>
-                <a:effectLst/>
-                <a:uLnTx/>
-                <a:uFillTx/>
-                <a:latin typeface="Segoe UI" panose="020B0502040204020203" pitchFamily="34" charset="0"/>
-                <a:ea typeface="+mn-ea"/>
-                <a:cs typeface="Segoe UI" panose="020B0502040204020203" pitchFamily="34" charset="0"/>
-              </a:rPr>
-              <a:t>	(Edit the variables to your environment)</a:t>
-            </a:r>
-          </a:p>
-          <a:p>
-            <a:pPr marL="628650" marR="0" lvl="1" indent="-171450" algn="l" defTabSz="914400" rtl="0" eaLnBrk="1" fontAlgn="auto" latinLnBrk="0" hangingPunct="1">
+          </a:p>
+          <a:p>
+            <a:pPr marR="0" lvl="1" algn="l" defTabSz="914400" rtl="0" eaLnBrk="1" fontAlgn="auto" latinLnBrk="0" hangingPunct="1">
               <a:lnSpc>
                 <a:spcPct val="100000"/>
               </a:lnSpc>
@@ -6999,287 +6961,6 @@
               </a:spcAft>
               <a:buClrTx/>
               <a:buSzTx/>
-              <a:buFont typeface="Arial" panose="020B0604020202020204" pitchFamily="34" charset="0"/>
-              <a:buChar char="•"/>
-              <a:tabLst/>
-              <a:defRPr/>
-            </a:pPr>
-            <a:r>
-              <a:rPr kumimoji="0" lang="en-US" sz="800" b="1" i="0" u="none" strike="noStrike" kern="1200" cap="none" spc="0" normalizeH="0" baseline="0" noProof="0" dirty="0">
-                <a:ln>
-                  <a:noFill/>
-                </a:ln>
-                <a:solidFill>
-                  <a:srgbClr val="A5A5A5">
-                    <a:lumMod val="75000"/>
-                  </a:srgbClr>
-                </a:solidFill>
-                <a:effectLst/>
-                <a:uLnTx/>
-                <a:uFillTx/>
-                <a:latin typeface="Segoe UI" panose="020B0502040204020203" pitchFamily="34" charset="0"/>
-                <a:ea typeface="+mn-ea"/>
-                <a:cs typeface="Segoe UI" panose="020B0502040204020203" pitchFamily="34" charset="0"/>
-              </a:rPr>
-              <a:t>@Azure:~$ </a:t>
-            </a:r>
-            <a:r>
-              <a:rPr kumimoji="0" lang="en-US" sz="800" b="0" i="0" u="none" strike="noStrike" kern="1200" cap="none" spc="0" normalizeH="0" baseline="0" noProof="0" dirty="0">
-                <a:ln>
-                  <a:noFill/>
-                </a:ln>
-                <a:solidFill>
-                  <a:srgbClr val="A5A5A5">
-                    <a:lumMod val="75000"/>
-                  </a:srgbClr>
-                </a:solidFill>
-                <a:effectLst/>
-                <a:uLnTx/>
-                <a:uFillTx/>
-                <a:latin typeface="Segoe UI" panose="020B0502040204020203" pitchFamily="34" charset="0"/>
-                <a:ea typeface="+mn-ea"/>
-                <a:cs typeface="Segoe UI" panose="020B0502040204020203" pitchFamily="34" charset="0"/>
-              </a:rPr>
-              <a:t>terraform </a:t>
-            </a:r>
-            <a:r>
-              <a:rPr kumimoji="0" lang="en-US" sz="800" b="0" i="0" u="none" strike="noStrike" kern="1200" cap="none" spc="0" normalizeH="0" baseline="0" noProof="0" dirty="0" err="1">
-                <a:ln>
-                  <a:noFill/>
-                </a:ln>
-                <a:solidFill>
-                  <a:srgbClr val="A5A5A5">
-                    <a:lumMod val="75000"/>
-                  </a:srgbClr>
-                </a:solidFill>
-                <a:effectLst/>
-                <a:uLnTx/>
-                <a:uFillTx/>
-                <a:latin typeface="Segoe UI" panose="020B0502040204020203" pitchFamily="34" charset="0"/>
-                <a:ea typeface="+mn-ea"/>
-                <a:cs typeface="Segoe UI" panose="020B0502040204020203" pitchFamily="34" charset="0"/>
-              </a:rPr>
-              <a:t>init</a:t>
-            </a:r>
-            <a:endParaRPr kumimoji="0" lang="en-US" sz="800" b="0" i="0" u="none" strike="noStrike" kern="1200" cap="none" spc="0" normalizeH="0" baseline="0" noProof="0" dirty="0">
-              <a:ln>
-                <a:noFill/>
-              </a:ln>
-              <a:solidFill>
-                <a:srgbClr val="A5A5A5">
-                  <a:lumMod val="75000"/>
-                </a:srgbClr>
-              </a:solidFill>
-              <a:effectLst/>
-              <a:uLnTx/>
-              <a:uFillTx/>
-              <a:latin typeface="Segoe UI" panose="020B0502040204020203" pitchFamily="34" charset="0"/>
-              <a:ea typeface="+mn-ea"/>
-              <a:cs typeface="Segoe UI" panose="020B0502040204020203" pitchFamily="34" charset="0"/>
-            </a:endParaRPr>
-          </a:p>
-          <a:p>
-            <a:pPr marL="628650" marR="0" lvl="1" indent="-171450" algn="l" defTabSz="914400" rtl="0" eaLnBrk="1" fontAlgn="auto" latinLnBrk="0" hangingPunct="1">
-              <a:lnSpc>
-                <a:spcPct val="100000"/>
-              </a:lnSpc>
-              <a:spcBef>
-                <a:spcPts val="0"/>
-              </a:spcBef>
-              <a:spcAft>
-                <a:spcPts val="0"/>
-              </a:spcAft>
-              <a:buClrTx/>
-              <a:buSzTx/>
-              <a:buFont typeface="Arial" panose="020B0604020202020204" pitchFamily="34" charset="0"/>
-              <a:buChar char="•"/>
-              <a:tabLst/>
-              <a:defRPr/>
-            </a:pPr>
-            <a:r>
-              <a:rPr kumimoji="0" lang="en-US" sz="800" b="1" i="0" u="none" strike="noStrike" kern="1200" cap="none" spc="0" normalizeH="0" baseline="0" noProof="0" dirty="0">
-                <a:ln>
-                  <a:noFill/>
-                </a:ln>
-                <a:solidFill>
-                  <a:srgbClr val="A5A5A5">
-                    <a:lumMod val="75000"/>
-                  </a:srgbClr>
-                </a:solidFill>
-                <a:effectLst/>
-                <a:uLnTx/>
-                <a:uFillTx/>
-                <a:latin typeface="Segoe UI" panose="020B0502040204020203" pitchFamily="34" charset="0"/>
-                <a:ea typeface="+mn-ea"/>
-                <a:cs typeface="Segoe UI" panose="020B0502040204020203" pitchFamily="34" charset="0"/>
-              </a:rPr>
-              <a:t>@Azure:~$ </a:t>
-            </a:r>
-            <a:r>
-              <a:rPr kumimoji="0" lang="en-US" sz="800" b="0" i="0" u="none" strike="noStrike" kern="1200" cap="none" spc="0" normalizeH="0" baseline="0" noProof="0" dirty="0">
-                <a:ln>
-                  <a:noFill/>
-                </a:ln>
-                <a:solidFill>
-                  <a:srgbClr val="A5A5A5">
-                    <a:lumMod val="75000"/>
-                  </a:srgbClr>
-                </a:solidFill>
-                <a:effectLst/>
-                <a:uLnTx/>
-                <a:uFillTx/>
-                <a:latin typeface="Segoe UI" panose="020B0502040204020203" pitchFamily="34" charset="0"/>
-                <a:ea typeface="+mn-ea"/>
-                <a:cs typeface="Segoe UI" panose="020B0502040204020203" pitchFamily="34" charset="0"/>
-              </a:rPr>
-              <a:t>terraform plan</a:t>
-            </a:r>
-          </a:p>
-          <a:p>
-            <a:pPr marL="628650" marR="0" lvl="1" indent="-171450" algn="l" defTabSz="914400" rtl="0" eaLnBrk="1" fontAlgn="auto" latinLnBrk="0" hangingPunct="1">
-              <a:lnSpc>
-                <a:spcPct val="100000"/>
-              </a:lnSpc>
-              <a:spcBef>
-                <a:spcPts val="0"/>
-              </a:spcBef>
-              <a:spcAft>
-                <a:spcPts val="0"/>
-              </a:spcAft>
-              <a:buClrTx/>
-              <a:buSzTx/>
-              <a:buFont typeface="Arial" panose="020B0604020202020204" pitchFamily="34" charset="0"/>
-              <a:buChar char="•"/>
-              <a:tabLst/>
-              <a:defRPr/>
-            </a:pPr>
-            <a:r>
-              <a:rPr kumimoji="0" lang="en-US" sz="800" b="1" i="0" u="none" strike="noStrike" kern="1200" cap="none" spc="0" normalizeH="0" baseline="0" noProof="0" dirty="0">
-                <a:ln>
-                  <a:noFill/>
-                </a:ln>
-                <a:solidFill>
-                  <a:srgbClr val="A5A5A5">
-                    <a:lumMod val="75000"/>
-                  </a:srgbClr>
-                </a:solidFill>
-                <a:effectLst/>
-                <a:uLnTx/>
-                <a:uFillTx/>
-                <a:latin typeface="Segoe UI" panose="020B0502040204020203" pitchFamily="34" charset="0"/>
-                <a:ea typeface="+mn-ea"/>
-                <a:cs typeface="Segoe UI" panose="020B0502040204020203" pitchFamily="34" charset="0"/>
-              </a:rPr>
-              <a:t>@Azure:~$ </a:t>
-            </a:r>
-            <a:r>
-              <a:rPr kumimoji="0" lang="en-US" sz="800" b="0" i="0" u="none" strike="noStrike" kern="1200" cap="none" spc="0" normalizeH="0" baseline="0" noProof="0" dirty="0">
-                <a:ln>
-                  <a:noFill/>
-                </a:ln>
-                <a:solidFill>
-                  <a:srgbClr val="A5A5A5">
-                    <a:lumMod val="75000"/>
-                  </a:srgbClr>
-                </a:solidFill>
-                <a:effectLst/>
-                <a:uLnTx/>
-                <a:uFillTx/>
-                <a:latin typeface="Segoe UI" panose="020B0502040204020203" pitchFamily="34" charset="0"/>
-                <a:ea typeface="+mn-ea"/>
-                <a:cs typeface="Segoe UI" panose="020B0502040204020203" pitchFamily="34" charset="0"/>
-              </a:rPr>
-              <a:t>terraform apply	(Deploy via Terraform)</a:t>
-            </a:r>
-          </a:p>
-          <a:p>
-            <a:pPr marL="628650" marR="0" lvl="1" indent="-171450" algn="l" defTabSz="914400" rtl="0" eaLnBrk="1" fontAlgn="auto" latinLnBrk="0" hangingPunct="1">
-              <a:lnSpc>
-                <a:spcPct val="100000"/>
-              </a:lnSpc>
-              <a:spcBef>
-                <a:spcPts val="0"/>
-              </a:spcBef>
-              <a:spcAft>
-                <a:spcPts val="0"/>
-              </a:spcAft>
-              <a:buClrTx/>
-              <a:buSzTx/>
-              <a:buFont typeface="Arial" panose="020B0604020202020204" pitchFamily="34" charset="0"/>
-              <a:buChar char="•"/>
-              <a:tabLst/>
-              <a:defRPr/>
-            </a:pPr>
-            <a:r>
-              <a:rPr kumimoji="0" lang="en-US" sz="800" b="1" i="0" u="none" strike="noStrike" kern="1200" cap="none" spc="0" normalizeH="0" baseline="0" noProof="0" dirty="0">
-                <a:ln>
-                  <a:noFill/>
-                </a:ln>
-                <a:solidFill>
-                  <a:srgbClr val="A5A5A5">
-                    <a:lumMod val="75000"/>
-                  </a:srgbClr>
-                </a:solidFill>
-                <a:effectLst/>
-                <a:uLnTx/>
-                <a:uFillTx/>
-                <a:latin typeface="Segoe UI" panose="020B0502040204020203" pitchFamily="34" charset="0"/>
-                <a:ea typeface="+mn-ea"/>
-                <a:cs typeface="Segoe UI" panose="020B0502040204020203" pitchFamily="34" charset="0"/>
-              </a:rPr>
-              <a:t>@Azure:~$ </a:t>
-            </a:r>
-            <a:r>
-              <a:rPr kumimoji="0" lang="en-US" sz="800" b="0" i="0" u="none" strike="noStrike" kern="1200" cap="none" spc="0" normalizeH="0" baseline="0" noProof="0" dirty="0">
-                <a:ln>
-                  <a:noFill/>
-                </a:ln>
-                <a:solidFill>
-                  <a:srgbClr val="A5A5A5">
-                    <a:lumMod val="75000"/>
-                  </a:srgbClr>
-                </a:solidFill>
-                <a:effectLst/>
-                <a:uLnTx/>
-                <a:uFillTx/>
-                <a:latin typeface="Segoe UI" panose="020B0502040204020203" pitchFamily="34" charset="0"/>
-                <a:ea typeface="+mn-ea"/>
-                <a:cs typeface="Segoe UI" panose="020B0502040204020203" pitchFamily="34" charset="0"/>
-              </a:rPr>
-              <a:t>bash configure.sh	(Configurations that can’t be done in Terraform)</a:t>
-            </a:r>
-            <a:endParaRPr kumimoji="0" lang="en-US" sz="1400" b="0" i="0" u="none" strike="noStrike" kern="1200" cap="none" spc="0" normalizeH="0" baseline="0" noProof="0" dirty="0">
-              <a:ln>
-                <a:noFill/>
-              </a:ln>
-              <a:solidFill>
-                <a:prstClr val="white">
-                  <a:lumMod val="65000"/>
-                </a:prstClr>
-              </a:solidFill>
-              <a:effectLst/>
-              <a:uLnTx/>
-              <a:uFillTx/>
-              <a:latin typeface="Calibri" panose="020F0502020204030204"/>
-              <a:ea typeface="+mn-ea"/>
-              <a:cs typeface="+mn-cs"/>
-            </a:endParaRPr>
-          </a:p>
-          <a:p>
-            <a:pPr marL="0" marR="0" lvl="0" indent="0" algn="l" defTabSz="914400" rtl="0" eaLnBrk="1" fontAlgn="auto" latinLnBrk="0" hangingPunct="1">
-              <a:lnSpc>
-                <a:spcPct val="100000"/>
-              </a:lnSpc>
-              <a:spcBef>
-                <a:spcPts val="0"/>
-              </a:spcBef>
-              <a:spcAft>
-                <a:spcPts val="0"/>
-              </a:spcAft>
-              <a:buClrTx/>
-              <a:buSzTx/>
-              <a:buFontTx/>
-              <a:buNone/>
               <a:tabLst/>
               <a:defRPr/>
             </a:pPr>

</xml_diff>